<commit_message>
Final slides with review comments integrated
</commit_message>
<xml_diff>
--- a/transferring_data/File_transfer.pptx
+++ b/transferring_data/File_transfer.pptx
@@ -5,7 +5,7 @@
     <p:sldMasterId id="2147483660" r:id="rId4"/>
   </p:sldMasterIdLst>
   <p:notesMasterIdLst>
-    <p:notesMasterId r:id="rId26"/>
+    <p:notesMasterId r:id="rId25"/>
   </p:notesMasterIdLst>
   <p:sldIdLst>
     <p:sldId id="340" r:id="rId5"/>
@@ -28,7 +28,6 @@
     <p:sldId id="274" r:id="rId22"/>
     <p:sldId id="392" r:id="rId23"/>
     <p:sldId id="337" r:id="rId24"/>
-    <p:sldId id="350" r:id="rId25"/>
   </p:sldIdLst>
   <p:sldSz cx="12192000" cy="6858000"/>
   <p:notesSz cx="6858000" cy="9144000"/>
@@ -1555,162 +1554,6 @@
     <p:extLst>
       <p:ext uri="{BB962C8B-B14F-4D97-AF65-F5344CB8AC3E}">
         <p14:creationId xmlns:p14="http://schemas.microsoft.com/office/powerpoint/2010/main" val="136678123"/>
-      </p:ext>
-    </p:extLst>
-  </p:cSld>
-  <p:clrMapOvr>
-    <a:masterClrMapping/>
-  </p:clrMapOvr>
-</p:notes>
-</file>
-
-<file path=ppt/notesSlides/notesSlide20.xml><?xml version="1.0" encoding="utf-8"?>
-<p:notes xmlns:a="http://schemas.openxmlformats.org/drawingml/2006/main" xmlns:r="http://schemas.openxmlformats.org/officeDocument/2006/relationships" xmlns:p="http://schemas.openxmlformats.org/presentationml/2006/main" showMasterSp="0" showMasterPhAnim="0">
-  <p:cSld>
-    <p:spTree>
-      <p:nvGrpSpPr>
-        <p:cNvPr id="1" name="Shape 908"/>
-        <p:cNvGrpSpPr/>
-        <p:nvPr/>
-      </p:nvGrpSpPr>
-      <p:grpSpPr>
-        <a:xfrm>
-          <a:off x="0" y="0"/>
-          <a:ext cx="0" cy="0"/>
-          <a:chOff x="0" y="0"/>
-          <a:chExt cx="0" cy="0"/>
-        </a:xfrm>
-      </p:grpSpPr>
-      <p:sp>
-        <p:nvSpPr>
-          <p:cNvPr id="909" name="Google Shape;909;g12316551eda_0_874:notes"/>
-          <p:cNvSpPr>
-            <a:spLocks noGrp="1" noRot="1" noChangeAspect="1"/>
-          </p:cNvSpPr>
-          <p:nvPr>
-            <p:ph type="sldImg" idx="2"/>
-          </p:nvPr>
-        </p:nvSpPr>
-        <p:spPr>
-          <a:xfrm>
-            <a:off x="685800" y="1143000"/>
-            <a:ext cx="5486400" cy="3086100"/>
-          </a:xfrm>
-          <a:custGeom>
-            <a:avLst/>
-            <a:gdLst/>
-            <a:ahLst/>
-            <a:cxnLst/>
-            <a:rect l="l" t="t" r="r" b="b"/>
-            <a:pathLst>
-              <a:path w="120000" h="120000" extrusionOk="0">
-                <a:moveTo>
-                  <a:pt x="0" y="0"/>
-                </a:moveTo>
-                <a:lnTo>
-                  <a:pt x="120000" y="0"/>
-                </a:lnTo>
-                <a:lnTo>
-                  <a:pt x="120000" y="120000"/>
-                </a:lnTo>
-                <a:lnTo>
-                  <a:pt x="0" y="120000"/>
-                </a:lnTo>
-                <a:close/>
-              </a:path>
-            </a:pathLst>
-          </a:custGeom>
-        </p:spPr>
-      </p:sp>
-      <p:sp>
-        <p:nvSpPr>
-          <p:cNvPr id="910" name="Google Shape;910;g12316551eda_0_874:notes"/>
-          <p:cNvSpPr txBox="1">
-            <a:spLocks noGrp="1"/>
-          </p:cNvSpPr>
-          <p:nvPr>
-            <p:ph type="body" idx="1"/>
-          </p:nvPr>
-        </p:nvSpPr>
-        <p:spPr>
-          <a:xfrm>
-            <a:off x="685800" y="4400550"/>
-            <a:ext cx="5486400" cy="3600600"/>
-          </a:xfrm>
-          <a:prstGeom prst="rect">
-            <a:avLst/>
-          </a:prstGeom>
-        </p:spPr>
-        <p:txBody>
-          <a:bodyPr spcFirstLastPara="1" wrap="square" lIns="91425" tIns="45700" rIns="91425" bIns="45700" anchor="t" anchorCtr="0">
-            <a:noAutofit/>
-          </a:bodyPr>
-          <a:lstStyle/>
-          <a:p>
-            <a:pPr marL="0" lvl="0" indent="0" algn="l" rtl="0">
-              <a:spcBef>
-                <a:spcPts val="0"/>
-              </a:spcBef>
-              <a:spcAft>
-                <a:spcPts val="0"/>
-              </a:spcAft>
-              <a:buNone/>
-            </a:pPr>
-            <a:endParaRPr/>
-          </a:p>
-        </p:txBody>
-      </p:sp>
-      <p:sp>
-        <p:nvSpPr>
-          <p:cNvPr id="911" name="Google Shape;911;g12316551eda_0_874:notes"/>
-          <p:cNvSpPr txBox="1">
-            <a:spLocks noGrp="1"/>
-          </p:cNvSpPr>
-          <p:nvPr>
-            <p:ph type="sldNum" idx="12"/>
-          </p:nvPr>
-        </p:nvSpPr>
-        <p:spPr>
-          <a:xfrm>
-            <a:off x="3884613" y="8685213"/>
-            <a:ext cx="2971800" cy="458700"/>
-          </a:xfrm>
-          <a:prstGeom prst="rect">
-            <a:avLst/>
-          </a:prstGeom>
-        </p:spPr>
-        <p:txBody>
-          <a:bodyPr spcFirstLastPara="1" wrap="square" lIns="91425" tIns="45700" rIns="91425" bIns="45700" anchor="b" anchorCtr="0">
-            <a:noAutofit/>
-          </a:bodyPr>
-          <a:lstStyle/>
-          <a:p>
-            <a:pPr marL="0" lvl="0" indent="0" algn="r" rtl="0">
-              <a:spcBef>
-                <a:spcPts val="0"/>
-              </a:spcBef>
-              <a:spcAft>
-                <a:spcPts val="0"/>
-              </a:spcAft>
-              <a:buClr>
-                <a:srgbClr val="000000"/>
-              </a:buClr>
-              <a:buSzPts val="1200"/>
-              <a:buFont typeface="Arial"/>
-              <a:buNone/>
-            </a:pPr>
-            <a:fld id="{00000000-1234-1234-1234-123412341234}" type="slidenum">
-              <a:rPr lang="en-US"/>
-              <a:t>21</a:t>
-            </a:fld>
-            <a:endParaRPr/>
-          </a:p>
-        </p:txBody>
-      </p:sp>
-    </p:spTree>
-    <p:extLst>
-      <p:ext uri="{BB962C8B-B14F-4D97-AF65-F5344CB8AC3E}">
-        <p14:creationId xmlns:p14="http://schemas.microsoft.com/office/powerpoint/2010/main" val="4250521008"/>
       </p:ext>
     </p:extLst>
   </p:cSld>
@@ -7496,313 +7339,6 @@
     <p:extLst>
       <p:ext uri="{BB962C8B-B14F-4D97-AF65-F5344CB8AC3E}">
         <p14:creationId xmlns:p14="http://schemas.microsoft.com/office/powerpoint/2010/main" val="900575765"/>
-      </p:ext>
-    </p:extLst>
-  </p:cSld>
-  <p:clrMapOvr>
-    <a:masterClrMapping/>
-  </p:clrMapOvr>
-</p:sld>
-</file>
-
-<file path=ppt/slides/slide21.xml><?xml version="1.0" encoding="utf-8"?>
-<p:sld xmlns:a="http://schemas.openxmlformats.org/drawingml/2006/main" xmlns:r="http://schemas.openxmlformats.org/officeDocument/2006/relationships" xmlns:p="http://schemas.openxmlformats.org/presentationml/2006/main">
-  <p:cSld>
-    <p:spTree>
-      <p:nvGrpSpPr>
-        <p:cNvPr id="1" name="Shape 912"/>
-        <p:cNvGrpSpPr/>
-        <p:nvPr/>
-      </p:nvGrpSpPr>
-      <p:grpSpPr>
-        <a:xfrm>
-          <a:off x="0" y="0"/>
-          <a:ext cx="0" cy="0"/>
-          <a:chOff x="0" y="0"/>
-          <a:chExt cx="0" cy="0"/>
-        </a:xfrm>
-      </p:grpSpPr>
-      <p:sp>
-        <p:nvSpPr>
-          <p:cNvPr id="913" name="Google Shape;913;p78"/>
-          <p:cNvSpPr txBox="1">
-            <a:spLocks noGrp="1"/>
-          </p:cNvSpPr>
-          <p:nvPr>
-            <p:ph type="title"/>
-          </p:nvPr>
-        </p:nvSpPr>
-        <p:spPr>
-          <a:xfrm>
-            <a:off x="838200" y="365125"/>
-            <a:ext cx="10515600" cy="1325700"/>
-          </a:xfrm>
-          <a:prstGeom prst="rect">
-            <a:avLst/>
-          </a:prstGeom>
-        </p:spPr>
-        <p:txBody>
-          <a:bodyPr spcFirstLastPara="1" wrap="square" lIns="91425" tIns="45700" rIns="91425" bIns="45700" anchor="ctr" anchorCtr="0">
-            <a:normAutofit/>
-          </a:bodyPr>
-          <a:lstStyle/>
-          <a:p>
-            <a:pPr marL="0" lvl="0" indent="0" algn="l" rtl="0">
-              <a:spcBef>
-                <a:spcPts val="0"/>
-              </a:spcBef>
-              <a:spcAft>
-                <a:spcPts val="0"/>
-              </a:spcAft>
-              <a:buNone/>
-            </a:pPr>
-            <a:r>
-              <a:rPr lang="en-US" sz="4800" b="1" dirty="0"/>
-              <a:t>Thank you! </a:t>
-            </a:r>
-            <a:endParaRPr sz="4800" b="1" dirty="0"/>
-          </a:p>
-        </p:txBody>
-      </p:sp>
-      <p:sp>
-        <p:nvSpPr>
-          <p:cNvPr id="2" name="Google Shape;913;p78">
-            <a:extLst>
-              <a:ext uri="{FF2B5EF4-FFF2-40B4-BE49-F238E27FC236}">
-                <a16:creationId xmlns:a16="http://schemas.microsoft.com/office/drawing/2014/main" id="{6598FD10-7D38-4EBF-DFFC-AF789EAB271B}"/>
-              </a:ext>
-            </a:extLst>
-          </p:cNvPr>
-          <p:cNvSpPr txBox="1">
-            <a:spLocks/>
-          </p:cNvSpPr>
-          <p:nvPr/>
-        </p:nvSpPr>
-        <p:spPr>
-          <a:xfrm>
-            <a:off x="753093" y="2150994"/>
-            <a:ext cx="10515600" cy="1325700"/>
-          </a:xfrm>
-          <a:prstGeom prst="rect">
-            <a:avLst/>
-          </a:prstGeom>
-        </p:spPr>
-        <p:txBody>
-          <a:bodyPr spcFirstLastPara="1" vert="horz" wrap="square" lIns="91425" tIns="45700" rIns="91425" bIns="45700" rtlCol="0" anchor="ctr" anchorCtr="0">
-            <a:normAutofit/>
-          </a:bodyPr>
-          <a:lstStyle>
-            <a:lvl1pPr algn="l" defTabSz="914400" rtl="0" eaLnBrk="1" latinLnBrk="0" hangingPunct="1">
-              <a:lnSpc>
-                <a:spcPct val="90000"/>
-              </a:lnSpc>
-              <a:spcBef>
-                <a:spcPct val="0"/>
-              </a:spcBef>
-              <a:buNone/>
-              <a:defRPr sz="4400" kern="1200">
-                <a:solidFill>
-                  <a:schemeClr val="tx1"/>
-                </a:solidFill>
-                <a:latin typeface="+mj-lt"/>
-                <a:ea typeface="+mj-ea"/>
-                <a:cs typeface="+mj-cs"/>
-              </a:defRPr>
-            </a:lvl1pPr>
-          </a:lstStyle>
-          <a:p>
-            <a:pPr>
-              <a:spcBef>
-                <a:spcPts val="0"/>
-              </a:spcBef>
-            </a:pPr>
-            <a:r>
-              <a:rPr lang="en-US"/>
-              <a:t>Survey and feedback</a:t>
-            </a:r>
-          </a:p>
-        </p:txBody>
-      </p:sp>
-      <p:sp>
-        <p:nvSpPr>
-          <p:cNvPr id="914" name="Google Shape;914;p78"/>
-          <p:cNvSpPr txBox="1">
-            <a:spLocks noGrp="1"/>
-          </p:cNvSpPr>
-          <p:nvPr>
-            <p:ph type="body" idx="1"/>
-          </p:nvPr>
-        </p:nvSpPr>
-        <p:spPr>
-          <a:xfrm>
-            <a:off x="838200" y="1825625"/>
-            <a:ext cx="10515600" cy="4163100"/>
-          </a:xfrm>
-          <a:prstGeom prst="rect">
-            <a:avLst/>
-          </a:prstGeom>
-        </p:spPr>
-        <p:txBody>
-          <a:bodyPr spcFirstLastPara="1" wrap="square" lIns="91425" tIns="45700" rIns="91425" bIns="45700" anchor="t" anchorCtr="0">
-            <a:normAutofit/>
-          </a:bodyPr>
-          <a:lstStyle/>
-          <a:p>
-            <a:pPr marL="177800" lvl="0" indent="0" algn="l" rtl="0">
-              <a:lnSpc>
-                <a:spcPct val="200000"/>
-              </a:lnSpc>
-              <a:spcBef>
-                <a:spcPts val="800"/>
-              </a:spcBef>
-              <a:spcAft>
-                <a:spcPts val="0"/>
-              </a:spcAft>
-              <a:buClr>
-                <a:schemeClr val="dk1"/>
-              </a:buClr>
-              <a:buSzPts val="1100"/>
-              <a:buFont typeface="Arial"/>
-              <a:buNone/>
-            </a:pPr>
-            <a:endParaRPr sz="2600"/>
-          </a:p>
-          <a:p>
-            <a:pPr marL="0" lvl="0" indent="0" algn="l" rtl="0">
-              <a:lnSpc>
-                <a:spcPct val="200000"/>
-              </a:lnSpc>
-              <a:spcBef>
-                <a:spcPts val="800"/>
-              </a:spcBef>
-              <a:spcAft>
-                <a:spcPts val="0"/>
-              </a:spcAft>
-              <a:buClr>
-                <a:schemeClr val="dk1"/>
-              </a:buClr>
-              <a:buSzPts val="1100"/>
-              <a:buFont typeface="Arial"/>
-              <a:buNone/>
-            </a:pPr>
-            <a:r>
-              <a:rPr lang="en-US" sz="3000" u="sng">
-                <a:solidFill>
-                  <a:schemeClr val="hlink"/>
-                </a:solidFill>
-                <a:hlinkClick r:id="rId3"/>
-              </a:rPr>
-              <a:t>http://tinyurl.com/curc-survey18</a:t>
-            </a:r>
-            <a:endParaRPr sz="3000"/>
-          </a:p>
-          <a:p>
-            <a:pPr marL="0" lvl="0" indent="0" algn="l" rtl="0">
-              <a:spcBef>
-                <a:spcPts val="1000"/>
-              </a:spcBef>
-              <a:spcAft>
-                <a:spcPts val="0"/>
-              </a:spcAft>
-              <a:buNone/>
-            </a:pPr>
-            <a:endParaRPr sz="3300"/>
-          </a:p>
-        </p:txBody>
-      </p:sp>
-      <p:pic>
-        <p:nvPicPr>
-          <p:cNvPr id="3" name="Picture 2" descr="QR code for course survey and feedback">
-            <a:extLst>
-              <a:ext uri="{FF2B5EF4-FFF2-40B4-BE49-F238E27FC236}">
-                <a16:creationId xmlns:a16="http://schemas.microsoft.com/office/drawing/2014/main" id="{FB3B42ED-3AFD-2CAE-AC47-A546D553AC65}"/>
-              </a:ext>
-            </a:extLst>
-          </p:cNvPr>
-          <p:cNvPicPr>
-            <a:picLocks noChangeAspect="1"/>
-          </p:cNvPicPr>
-          <p:nvPr/>
-        </p:nvPicPr>
-        <p:blipFill>
-          <a:blip r:embed="rId4"/>
-          <a:stretch>
-            <a:fillRect/>
-          </a:stretch>
-        </p:blipFill>
-        <p:spPr>
-          <a:xfrm>
-            <a:off x="6907300" y="1690825"/>
-            <a:ext cx="4089400" cy="4051300"/>
-          </a:xfrm>
-          <a:prstGeom prst="rect">
-            <a:avLst/>
-          </a:prstGeom>
-        </p:spPr>
-      </p:pic>
-      <p:sp>
-        <p:nvSpPr>
-          <p:cNvPr id="4" name="Date Placeholder 3">
-            <a:extLst>
-              <a:ext uri="{FF2B5EF4-FFF2-40B4-BE49-F238E27FC236}">
-                <a16:creationId xmlns:a16="http://schemas.microsoft.com/office/drawing/2014/main" id="{772815EA-2915-4E51-F36A-8658A77A19B3}"/>
-              </a:ext>
-            </a:extLst>
-          </p:cNvPr>
-          <p:cNvSpPr>
-            <a:spLocks noGrp="1"/>
-          </p:cNvSpPr>
-          <p:nvPr>
-            <p:ph type="dt" sz="half" idx="10"/>
-          </p:nvPr>
-        </p:nvSpPr>
-        <p:spPr/>
-        <p:txBody>
-          <a:bodyPr/>
-          <a:lstStyle/>
-          <a:p>
-            <a:pPr algn="ctr"/>
-            <a:r>
-              <a:rPr lang="en-US"/>
-              <a:t>Data Transfer - 8/13/2024</a:t>
-            </a:r>
-            <a:endParaRPr lang="en-US" dirty="0"/>
-          </a:p>
-        </p:txBody>
-      </p:sp>
-      <p:sp>
-        <p:nvSpPr>
-          <p:cNvPr id="5" name="Slide Number Placeholder 4">
-            <a:extLst>
-              <a:ext uri="{FF2B5EF4-FFF2-40B4-BE49-F238E27FC236}">
-                <a16:creationId xmlns:a16="http://schemas.microsoft.com/office/drawing/2014/main" id="{D1A80053-853D-3CEE-84F8-960D45375599}"/>
-              </a:ext>
-            </a:extLst>
-          </p:cNvPr>
-          <p:cNvSpPr>
-            <a:spLocks noGrp="1"/>
-          </p:cNvSpPr>
-          <p:nvPr>
-            <p:ph type="sldNum" sz="quarter" idx="12"/>
-          </p:nvPr>
-        </p:nvSpPr>
-        <p:spPr/>
-        <p:txBody>
-          <a:bodyPr/>
-          <a:lstStyle/>
-          <a:p>
-            <a:fld id="{ABDA560F-461C-6043-9BC4-489BA92F7161}" type="slidenum">
-              <a:rPr lang="en-US" smtClean="0"/>
-              <a:t>21</a:t>
-            </a:fld>
-            <a:endParaRPr lang="en-US"/>
-          </a:p>
-        </p:txBody>
-      </p:sp>
-    </p:spTree>
-    <p:extLst>
-      <p:ext uri="{BB962C8B-B14F-4D97-AF65-F5344CB8AC3E}">
-        <p14:creationId xmlns:p14="http://schemas.microsoft.com/office/powerpoint/2010/main" val="831802954"/>
       </p:ext>
     </p:extLst>
   </p:cSld>
@@ -11334,15 +10870,6 @@
 </file>
 
 <file path=customXml/item2.xml><?xml version="1.0" encoding="utf-8"?>
-<?mso-contentType ?>
-<FormTemplates xmlns="http://schemas.microsoft.com/sharepoint/v3/contenttype/forms">
-  <Display>DocumentLibraryForm</Display>
-  <Edit>DocumentLibraryForm</Edit>
-  <New>DocumentLibraryForm</New>
-</FormTemplates>
-</file>
-
-<file path=customXml/item3.xml><?xml version="1.0" encoding="utf-8"?>
 <p:properties xmlns:p="http://schemas.microsoft.com/office/2006/metadata/properties" xmlns:xsi="http://www.w3.org/2001/XMLSchema-instance" xmlns:pc="http://schemas.microsoft.com/office/infopath/2007/PartnerControls">
   <documentManagement>
     <TaxCatchAll xmlns="92c16b9d-8c83-445e-a4f4-1fe3d2f43f13" xsi:nil="true"/>
@@ -11351,6 +10878,15 @@
     </lcf76f155ced4ddcb4097134ff3c332f>
   </documentManagement>
 </p:properties>
+</file>
+
+<file path=customXml/item3.xml><?xml version="1.0" encoding="utf-8"?>
+<?mso-contentType ?>
+<FormTemplates xmlns="http://schemas.microsoft.com/sharepoint/v3/contenttype/forms">
+  <Display>DocumentLibraryForm</Display>
+  <Edit>DocumentLibraryForm</Edit>
+  <New>DocumentLibraryForm</New>
+</FormTemplates>
 </file>
 
 <file path=customXml/itemProps1.xml><?xml version="1.0" encoding="utf-8"?>
@@ -11374,14 +10910,6 @@
 </file>
 
 <file path=customXml/itemProps2.xml><?xml version="1.0" encoding="utf-8"?>
-<ds:datastoreItem xmlns:ds="http://schemas.openxmlformats.org/officeDocument/2006/customXml" ds:itemID="{06B4C708-AA43-4CE7-BE2D-F9D9A02F4940}">
-  <ds:schemaRefs>
-    <ds:schemaRef ds:uri="http://schemas.microsoft.com/sharepoint/v3/contenttype/forms"/>
-  </ds:schemaRefs>
-</ds:datastoreItem>
-</file>
-
-<file path=customXml/itemProps3.xml><?xml version="1.0" encoding="utf-8"?>
 <ds:datastoreItem xmlns:ds="http://schemas.openxmlformats.org/officeDocument/2006/customXml" ds:itemID="{4AB02FF4-25A1-49FE-9DF7-DD19F525B7FA}">
   <ds:schemaRefs>
     <ds:schemaRef ds:uri="7e49f7d3-8802-46ca-9604-495ce27f67f4"/>
@@ -11397,4 +10925,12 @@
     <ds:schemaRef ds:uri="http://www.w3.org/XML/1998/namespace"/>
   </ds:schemaRefs>
 </ds:datastoreItem>
+</file>
+
+<file path=customXml/itemProps3.xml><?xml version="1.0" encoding="utf-8"?>
+<ds:datastoreItem xmlns:ds="http://schemas.openxmlformats.org/officeDocument/2006/customXml" ds:itemID="{06B4C708-AA43-4CE7-BE2D-F9D9A02F4940}">
+  <ds:schemaRefs>
+    <ds:schemaRef ds:uri="http://schemas.microsoft.com/sharepoint/v3/contenttype/forms"/>
+  </ds:schemaRefs>
+</ds:datastoreItem>
 </file>
</xml_diff>